<commit_message>
Add strtok and struct To Review
</commit_message>
<xml_diff>
--- a/Slides/Review/121 Review.pptx
+++ b/Slides/Review/121 Review.pptx
@@ -11,6 +11,11 @@
     <p:sldId id="259" r:id="rId5"/>
     <p:sldId id="260" r:id="rId6"/>
     <p:sldId id="261" r:id="rId7"/>
+    <p:sldId id="262" r:id="rId8"/>
+    <p:sldId id="265" r:id="rId9"/>
+    <p:sldId id="266" r:id="rId10"/>
+    <p:sldId id="264" r:id="rId11"/>
+    <p:sldId id="263" r:id="rId12"/>
   </p:sldIdLst>
   <p:sldSz cx="12192000" cy="6858000"/>
   <p:notesSz cx="6858000" cy="9144000"/>
@@ -109,6 +114,11 @@
       </a:defRPr>
     </a:lvl9pPr>
   </p:defaultTextStyle>
+  <p:extLst>
+    <p:ext uri="{EFAFB233-063F-42B5-8137-9DF3F51BA10A}">
+      <p15:sldGuideLst xmlns:p15="http://schemas.microsoft.com/office/powerpoint/2012/main"/>
+    </p:ext>
+  </p:extLst>
 </p:presentation>
 </file>
 
@@ -282,7 +292,7 @@
           <a:p>
             <a:fld id="{48A87A34-81AB-432B-8DAE-1953F412C126}" type="datetimeFigureOut">
               <a:rPr lang="en-US" dirty="0"/>
-              <a:t>1/17/24</a:t>
+              <a:t>1/20/24</a:t>
             </a:fld>
             <a:endParaRPr lang="en-US" dirty="0"/>
           </a:p>
@@ -544,7 +554,7 @@
           <a:p>
             <a:fld id="{48A87A34-81AB-432B-8DAE-1953F412C126}" type="datetimeFigureOut">
               <a:rPr lang="en-US" dirty="0"/>
-              <a:t>1/17/24</a:t>
+              <a:t>1/20/24</a:t>
             </a:fld>
             <a:endParaRPr lang="en-US" dirty="0"/>
           </a:p>
@@ -771,7 +781,7 @@
             <a:fld id="{48A87A34-81AB-432B-8DAE-1953F412C126}" type="datetimeFigureOut">
               <a:rPr lang="en-US" dirty="0"/>
               <a:pPr/>
-              <a:t>1/17/24</a:t>
+              <a:t>1/20/24</a:t>
             </a:fld>
             <a:endParaRPr lang="en-US" dirty="0"/>
           </a:p>
@@ -1077,7 +1087,7 @@
             <a:fld id="{48A87A34-81AB-432B-8DAE-1953F412C126}" type="datetimeFigureOut">
               <a:rPr lang="en-US" dirty="0"/>
               <a:pPr/>
-              <a:t>1/17/24</a:t>
+              <a:t>1/20/24</a:t>
             </a:fld>
             <a:endParaRPr lang="en-US" dirty="0"/>
           </a:p>
@@ -1546,7 +1556,7 @@
             <a:fld id="{48A87A34-81AB-432B-8DAE-1953F412C126}" type="datetimeFigureOut">
               <a:rPr lang="en-US" dirty="0"/>
               <a:pPr/>
-              <a:t>1/17/24</a:t>
+              <a:t>1/20/24</a:t>
             </a:fld>
             <a:endParaRPr lang="en-US" dirty="0"/>
           </a:p>
@@ -2088,7 +2098,7 @@
           <a:p>
             <a:fld id="{48A87A34-81AB-432B-8DAE-1953F412C126}" type="datetimeFigureOut">
               <a:rPr lang="en-US" dirty="0"/>
-              <a:t>1/17/24</a:t>
+              <a:t>1/20/24</a:t>
             </a:fld>
             <a:endParaRPr lang="en-US" dirty="0"/>
           </a:p>
@@ -2857,7 +2867,7 @@
           <a:p>
             <a:fld id="{48A87A34-81AB-432B-8DAE-1953F412C126}" type="datetimeFigureOut">
               <a:rPr lang="en-US" dirty="0"/>
-              <a:t>1/17/24</a:t>
+              <a:t>1/20/24</a:t>
             </a:fld>
             <a:endParaRPr lang="en-US" dirty="0"/>
           </a:p>
@@ -3027,7 +3037,7 @@
           <a:p>
             <a:fld id="{48A87A34-81AB-432B-8DAE-1953F412C126}" type="datetimeFigureOut">
               <a:rPr lang="en-US" dirty="0"/>
-              <a:t>1/17/24</a:t>
+              <a:t>1/20/24</a:t>
             </a:fld>
             <a:endParaRPr lang="en-US" dirty="0"/>
           </a:p>
@@ -3246,7 +3256,7 @@
             <a:fld id="{48A87A34-81AB-432B-8DAE-1953F412C126}" type="datetimeFigureOut">
               <a:rPr lang="en-US" dirty="0"/>
               <a:pPr/>
-              <a:t>1/17/24</a:t>
+              <a:t>1/20/24</a:t>
             </a:fld>
             <a:endParaRPr lang="en-US" dirty="0"/>
           </a:p>
@@ -3421,7 +3431,7 @@
           <a:p>
             <a:fld id="{48A87A34-81AB-432B-8DAE-1953F412C126}" type="datetimeFigureOut">
               <a:rPr lang="en-US" dirty="0"/>
-              <a:t>1/17/24</a:t>
+              <a:t>1/20/24</a:t>
             </a:fld>
             <a:endParaRPr lang="en-US" dirty="0"/>
           </a:p>
@@ -3706,7 +3716,7 @@
             <a:fld id="{48A87A34-81AB-432B-8DAE-1953F412C126}" type="datetimeFigureOut">
               <a:rPr lang="en-US" dirty="0"/>
               <a:pPr/>
-              <a:t>1/17/24</a:t>
+              <a:t>1/20/24</a:t>
             </a:fld>
             <a:endParaRPr lang="en-US" dirty="0"/>
           </a:p>
@@ -3943,7 +3953,7 @@
           <a:p>
             <a:fld id="{48A87A34-81AB-432B-8DAE-1953F412C126}" type="datetimeFigureOut">
               <a:rPr lang="en-US" dirty="0"/>
-              <a:t>1/17/24</a:t>
+              <a:t>1/20/24</a:t>
             </a:fld>
             <a:endParaRPr lang="en-US" dirty="0"/>
           </a:p>
@@ -4317,7 +4327,7 @@
           <a:p>
             <a:fld id="{48A87A34-81AB-432B-8DAE-1953F412C126}" type="datetimeFigureOut">
               <a:rPr lang="en-US" dirty="0"/>
-              <a:t>1/17/24</a:t>
+              <a:t>1/20/24</a:t>
             </a:fld>
             <a:endParaRPr lang="en-US" dirty="0"/>
           </a:p>
@@ -4430,7 +4440,7 @@
           <a:p>
             <a:fld id="{48A87A34-81AB-432B-8DAE-1953F412C126}" type="datetimeFigureOut">
               <a:rPr lang="en-US" dirty="0"/>
-              <a:t>1/17/24</a:t>
+              <a:t>1/20/24</a:t>
             </a:fld>
             <a:endParaRPr lang="en-US" dirty="0"/>
           </a:p>
@@ -4520,7 +4530,7 @@
           <a:p>
             <a:fld id="{48A87A34-81AB-432B-8DAE-1953F412C126}" type="datetimeFigureOut">
               <a:rPr lang="en-US" dirty="0"/>
-              <a:t>1/17/24</a:t>
+              <a:t>1/20/24</a:t>
             </a:fld>
             <a:endParaRPr lang="en-US" dirty="0"/>
           </a:p>
@@ -4764,7 +4774,7 @@
           <a:p>
             <a:fld id="{48A87A34-81AB-432B-8DAE-1953F412C126}" type="datetimeFigureOut">
               <a:rPr lang="en-US" dirty="0"/>
-              <a:t>1/17/24</a:t>
+              <a:t>1/20/24</a:t>
             </a:fld>
             <a:endParaRPr lang="en-US" dirty="0"/>
           </a:p>
@@ -5016,7 +5026,7 @@
           <a:p>
             <a:fld id="{48A87A34-81AB-432B-8DAE-1953F412C126}" type="datetimeFigureOut">
               <a:rPr lang="en-US" dirty="0"/>
-              <a:t>1/17/24</a:t>
+              <a:t>1/20/24</a:t>
             </a:fld>
             <a:endParaRPr lang="en-US" dirty="0"/>
           </a:p>
@@ -5255,7 +5265,7 @@
             <a:fld id="{48A87A34-81AB-432B-8DAE-1953F412C126}" type="datetimeFigureOut">
               <a:rPr lang="en-US" dirty="0"/>
               <a:pPr/>
-              <a:t>1/17/24</a:t>
+              <a:t>1/20/24</a:t>
             </a:fld>
             <a:endParaRPr lang="en-US" dirty="0"/>
           </a:p>
@@ -5733,6 +5743,186 @@
 </p:sld>
 </file>
 
+<file path=ppt/slides/slide10.xml><?xml version="1.0" encoding="utf-8"?>
+<p:sld xmlns:a="http://schemas.openxmlformats.org/drawingml/2006/main" xmlns:r="http://schemas.openxmlformats.org/officeDocument/2006/relationships" xmlns:p="http://schemas.openxmlformats.org/presentationml/2006/main">
+  <p:cSld>
+    <p:spTree>
+      <p:nvGrpSpPr>
+        <p:cNvPr id="1" name=""/>
+        <p:cNvGrpSpPr/>
+        <p:nvPr/>
+      </p:nvGrpSpPr>
+      <p:grpSpPr>
+        <a:xfrm>
+          <a:off x="0" y="0"/>
+          <a:ext cx="0" cy="0"/>
+          <a:chOff x="0" y="0"/>
+          <a:chExt cx="0" cy="0"/>
+        </a:xfrm>
+      </p:grpSpPr>
+      <p:sp>
+        <p:nvSpPr>
+          <p:cNvPr id="2" name="Title 1">
+            <a:extLst>
+              <a:ext uri="{FF2B5EF4-FFF2-40B4-BE49-F238E27FC236}">
+                <a16:creationId xmlns:a16="http://schemas.microsoft.com/office/drawing/2014/main" id="{6BDAC6C9-450E-42C8-0141-DB146ED3A0D0}"/>
+              </a:ext>
+            </a:extLst>
+          </p:cNvPr>
+          <p:cNvSpPr>
+            <a:spLocks noGrp="1"/>
+          </p:cNvSpPr>
+          <p:nvPr>
+            <p:ph type="ctrTitle"/>
+          </p:nvPr>
+        </p:nvSpPr>
+        <p:spPr/>
+        <p:txBody>
+          <a:bodyPr/>
+          <a:lstStyle/>
+          <a:p>
+            <a:r>
+              <a:rPr lang="en-US" dirty="0"/>
+              <a:t>Malloc</a:t>
+            </a:r>
+          </a:p>
+        </p:txBody>
+      </p:sp>
+      <p:sp>
+        <p:nvSpPr>
+          <p:cNvPr id="3" name="Subtitle 2">
+            <a:extLst>
+              <a:ext uri="{FF2B5EF4-FFF2-40B4-BE49-F238E27FC236}">
+                <a16:creationId xmlns:a16="http://schemas.microsoft.com/office/drawing/2014/main" id="{3F20F68D-BA45-99E7-B181-12B8A37C777A}"/>
+              </a:ext>
+            </a:extLst>
+          </p:cNvPr>
+          <p:cNvSpPr>
+            <a:spLocks noGrp="1"/>
+          </p:cNvSpPr>
+          <p:nvPr>
+            <p:ph type="subTitle" idx="1"/>
+          </p:nvPr>
+        </p:nvSpPr>
+        <p:spPr/>
+        <p:txBody>
+          <a:bodyPr/>
+          <a:lstStyle/>
+          <a:p>
+            <a:r>
+              <a:rPr lang="en-US" dirty="0">
+                <a:latin typeface="PT Mono" panose="02060509020205020204" pitchFamily="49" charset="77"/>
+              </a:rPr>
+              <a:t>#include &lt;</a:t>
+            </a:r>
+            <a:r>
+              <a:rPr lang="en-US" dirty="0" err="1">
+                <a:latin typeface="PT Mono" panose="02060509020205020204" pitchFamily="49" charset="77"/>
+              </a:rPr>
+              <a:t>stdlib.h</a:t>
+            </a:r>
+            <a:r>
+              <a:rPr lang="en-US" dirty="0">
+                <a:latin typeface="PT Mono" panose="02060509020205020204" pitchFamily="49" charset="77"/>
+              </a:rPr>
+              <a:t>&gt;</a:t>
+            </a:r>
+          </a:p>
+        </p:txBody>
+      </p:sp>
+    </p:spTree>
+    <p:extLst>
+      <p:ext uri="{BB962C8B-B14F-4D97-AF65-F5344CB8AC3E}">
+        <p14:creationId xmlns:p14="http://schemas.microsoft.com/office/powerpoint/2010/main" val="1125357504"/>
+      </p:ext>
+    </p:extLst>
+  </p:cSld>
+  <p:clrMapOvr>
+    <a:masterClrMapping/>
+  </p:clrMapOvr>
+</p:sld>
+</file>
+
+<file path=ppt/slides/slide11.xml><?xml version="1.0" encoding="utf-8"?>
+<p:sld xmlns:a="http://schemas.openxmlformats.org/drawingml/2006/main" xmlns:r="http://schemas.openxmlformats.org/officeDocument/2006/relationships" xmlns:p="http://schemas.openxmlformats.org/presentationml/2006/main">
+  <p:cSld>
+    <p:spTree>
+      <p:nvGrpSpPr>
+        <p:cNvPr id="1" name=""/>
+        <p:cNvGrpSpPr/>
+        <p:nvPr/>
+      </p:nvGrpSpPr>
+      <p:grpSpPr>
+        <a:xfrm>
+          <a:off x="0" y="0"/>
+          <a:ext cx="0" cy="0"/>
+          <a:chOff x="0" y="0"/>
+          <a:chExt cx="0" cy="0"/>
+        </a:xfrm>
+      </p:grpSpPr>
+      <p:sp>
+        <p:nvSpPr>
+          <p:cNvPr id="2" name="Title 1">
+            <a:extLst>
+              <a:ext uri="{FF2B5EF4-FFF2-40B4-BE49-F238E27FC236}">
+                <a16:creationId xmlns:a16="http://schemas.microsoft.com/office/drawing/2014/main" id="{76E0FB1D-7623-47AD-5479-508CF2F706C6}"/>
+              </a:ext>
+            </a:extLst>
+          </p:cNvPr>
+          <p:cNvSpPr>
+            <a:spLocks noGrp="1"/>
+          </p:cNvSpPr>
+          <p:nvPr>
+            <p:ph type="title"/>
+          </p:nvPr>
+        </p:nvSpPr>
+        <p:spPr/>
+        <p:txBody>
+          <a:bodyPr/>
+          <a:lstStyle/>
+          <a:p>
+            <a:endParaRPr lang="en-US" dirty="0"/>
+          </a:p>
+        </p:txBody>
+      </p:sp>
+      <p:sp>
+        <p:nvSpPr>
+          <p:cNvPr id="3" name="Content Placeholder 2">
+            <a:extLst>
+              <a:ext uri="{FF2B5EF4-FFF2-40B4-BE49-F238E27FC236}">
+                <a16:creationId xmlns:a16="http://schemas.microsoft.com/office/drawing/2014/main" id="{47D057D9-5EF7-021E-6AD4-6A766E8792D5}"/>
+              </a:ext>
+            </a:extLst>
+          </p:cNvPr>
+          <p:cNvSpPr>
+            <a:spLocks noGrp="1"/>
+          </p:cNvSpPr>
+          <p:nvPr>
+            <p:ph idx="1"/>
+          </p:nvPr>
+        </p:nvSpPr>
+        <p:spPr/>
+        <p:txBody>
+          <a:bodyPr/>
+          <a:lstStyle/>
+          <a:p>
+            <a:endParaRPr lang="en-US"/>
+          </a:p>
+        </p:txBody>
+      </p:sp>
+    </p:spTree>
+    <p:extLst>
+      <p:ext uri="{BB962C8B-B14F-4D97-AF65-F5344CB8AC3E}">
+        <p14:creationId xmlns:p14="http://schemas.microsoft.com/office/powerpoint/2010/main" val="3873922544"/>
+      </p:ext>
+    </p:extLst>
+  </p:cSld>
+  <p:clrMapOvr>
+    <a:masterClrMapping/>
+  </p:clrMapOvr>
+</p:sld>
+</file>
+
 <file path=ppt/slides/slide2.xml><?xml version="1.0" encoding="utf-8"?>
 <p:sld xmlns:a="http://schemas.openxmlformats.org/drawingml/2006/main" xmlns:r="http://schemas.openxmlformats.org/officeDocument/2006/relationships" xmlns:p="http://schemas.openxmlformats.org/presentationml/2006/main">
   <p:cSld>
@@ -6526,6 +6716,714 @@
     <p:extLst>
       <p:ext uri="{BB962C8B-B14F-4D97-AF65-F5344CB8AC3E}">
         <p14:creationId xmlns:p14="http://schemas.microsoft.com/office/powerpoint/2010/main" val="1845488620"/>
+      </p:ext>
+    </p:extLst>
+  </p:cSld>
+  <p:clrMapOvr>
+    <a:masterClrMapping/>
+  </p:clrMapOvr>
+</p:sld>
+</file>
+
+<file path=ppt/slides/slide7.xml><?xml version="1.0" encoding="utf-8"?>
+<p:sld xmlns:a="http://schemas.openxmlformats.org/drawingml/2006/main" xmlns:r="http://schemas.openxmlformats.org/officeDocument/2006/relationships" xmlns:p="http://schemas.openxmlformats.org/presentationml/2006/main">
+  <p:cSld>
+    <p:spTree>
+      <p:nvGrpSpPr>
+        <p:cNvPr id="1" name=""/>
+        <p:cNvGrpSpPr/>
+        <p:nvPr/>
+      </p:nvGrpSpPr>
+      <p:grpSpPr>
+        <a:xfrm>
+          <a:off x="0" y="0"/>
+          <a:ext cx="0" cy="0"/>
+          <a:chOff x="0" y="0"/>
+          <a:chExt cx="0" cy="0"/>
+        </a:xfrm>
+      </p:grpSpPr>
+      <p:sp>
+        <p:nvSpPr>
+          <p:cNvPr id="2" name="Title 1">
+            <a:extLst>
+              <a:ext uri="{FF2B5EF4-FFF2-40B4-BE49-F238E27FC236}">
+                <a16:creationId xmlns:a16="http://schemas.microsoft.com/office/drawing/2014/main" id="{6BDAC6C9-450E-42C8-0141-DB146ED3A0D0}"/>
+              </a:ext>
+            </a:extLst>
+          </p:cNvPr>
+          <p:cNvSpPr>
+            <a:spLocks noGrp="1"/>
+          </p:cNvSpPr>
+          <p:nvPr>
+            <p:ph type="ctrTitle"/>
+          </p:nvPr>
+        </p:nvSpPr>
+        <p:spPr/>
+        <p:txBody>
+          <a:bodyPr/>
+          <a:lstStyle/>
+          <a:p>
+            <a:r>
+              <a:rPr lang="en-US" dirty="0" err="1"/>
+              <a:t>Strtok</a:t>
+            </a:r>
+            <a:endParaRPr lang="en-US" dirty="0"/>
+          </a:p>
+        </p:txBody>
+      </p:sp>
+      <p:sp>
+        <p:nvSpPr>
+          <p:cNvPr id="3" name="Subtitle 2">
+            <a:extLst>
+              <a:ext uri="{FF2B5EF4-FFF2-40B4-BE49-F238E27FC236}">
+                <a16:creationId xmlns:a16="http://schemas.microsoft.com/office/drawing/2014/main" id="{3F20F68D-BA45-99E7-B181-12B8A37C777A}"/>
+              </a:ext>
+            </a:extLst>
+          </p:cNvPr>
+          <p:cNvSpPr>
+            <a:spLocks noGrp="1"/>
+          </p:cNvSpPr>
+          <p:nvPr>
+            <p:ph type="subTitle" idx="1"/>
+          </p:nvPr>
+        </p:nvSpPr>
+        <p:spPr/>
+        <p:txBody>
+          <a:bodyPr>
+            <a:normAutofit fontScale="92500" lnSpcReduction="10000"/>
+          </a:bodyPr>
+          <a:lstStyle/>
+          <a:p>
+            <a:r>
+              <a:rPr lang="en-US" dirty="0">
+                <a:latin typeface="PT Mono" panose="02060509020205020204" pitchFamily="49" charset="77"/>
+              </a:rPr>
+              <a:t>#include &lt;</a:t>
+            </a:r>
+            <a:r>
+              <a:rPr lang="en-US" dirty="0" err="1">
+                <a:latin typeface="PT Mono" panose="02060509020205020204" pitchFamily="49" charset="77"/>
+              </a:rPr>
+              <a:t>string.h</a:t>
+            </a:r>
+            <a:r>
+              <a:rPr lang="en-US" dirty="0">
+                <a:latin typeface="PT Mono" panose="02060509020205020204" pitchFamily="49" charset="77"/>
+              </a:rPr>
+              <a:t>&gt; (C)</a:t>
+            </a:r>
+          </a:p>
+          <a:p>
+            <a:r>
+              <a:rPr lang="en-US" dirty="0">
+                <a:latin typeface="PT Mono" panose="02060509020205020204" pitchFamily="49" charset="77"/>
+              </a:rPr>
+              <a:t>#include &lt;</a:t>
+            </a:r>
+            <a:r>
+              <a:rPr lang="en-US" dirty="0" err="1">
+                <a:latin typeface="PT Mono" panose="02060509020205020204" pitchFamily="49" charset="77"/>
+              </a:rPr>
+              <a:t>cstring</a:t>
+            </a:r>
+            <a:r>
+              <a:rPr lang="en-US" dirty="0">
+                <a:latin typeface="PT Mono" panose="02060509020205020204" pitchFamily="49" charset="77"/>
+              </a:rPr>
+              <a:t>&gt; (C++)</a:t>
+            </a:r>
+          </a:p>
+        </p:txBody>
+      </p:sp>
+    </p:spTree>
+    <p:extLst>
+      <p:ext uri="{BB962C8B-B14F-4D97-AF65-F5344CB8AC3E}">
+        <p14:creationId xmlns:p14="http://schemas.microsoft.com/office/powerpoint/2010/main" val="115353121"/>
+      </p:ext>
+    </p:extLst>
+  </p:cSld>
+  <p:clrMapOvr>
+    <a:masterClrMapping/>
+  </p:clrMapOvr>
+</p:sld>
+</file>
+
+<file path=ppt/slides/slide8.xml><?xml version="1.0" encoding="utf-8"?>
+<p:sld xmlns:a="http://schemas.openxmlformats.org/drawingml/2006/main" xmlns:r="http://schemas.openxmlformats.org/officeDocument/2006/relationships" xmlns:p="http://schemas.openxmlformats.org/presentationml/2006/main">
+  <p:cSld>
+    <p:spTree>
+      <p:nvGrpSpPr>
+        <p:cNvPr id="1" name=""/>
+        <p:cNvGrpSpPr/>
+        <p:nvPr/>
+      </p:nvGrpSpPr>
+      <p:grpSpPr>
+        <a:xfrm>
+          <a:off x="0" y="0"/>
+          <a:ext cx="0" cy="0"/>
+          <a:chOff x="0" y="0"/>
+          <a:chExt cx="0" cy="0"/>
+        </a:xfrm>
+      </p:grpSpPr>
+      <p:sp>
+        <p:nvSpPr>
+          <p:cNvPr id="2" name="Title 1">
+            <a:extLst>
+              <a:ext uri="{FF2B5EF4-FFF2-40B4-BE49-F238E27FC236}">
+                <a16:creationId xmlns:a16="http://schemas.microsoft.com/office/drawing/2014/main" id="{52B1C09F-D465-3179-2740-AB879286E824}"/>
+              </a:ext>
+            </a:extLst>
+          </p:cNvPr>
+          <p:cNvSpPr>
+            <a:spLocks noGrp="1"/>
+          </p:cNvSpPr>
+          <p:nvPr>
+            <p:ph type="title"/>
+          </p:nvPr>
+        </p:nvSpPr>
+        <p:spPr/>
+        <p:txBody>
+          <a:bodyPr/>
+          <a:lstStyle/>
+          <a:p>
+            <a:r>
+              <a:rPr lang="en-US" dirty="0"/>
+              <a:t>How to Call </a:t>
+            </a:r>
+            <a:r>
+              <a:rPr lang="en-US" dirty="0" err="1"/>
+              <a:t>strtok</a:t>
+            </a:r>
+            <a:endParaRPr lang="en-US" dirty="0"/>
+          </a:p>
+        </p:txBody>
+      </p:sp>
+      <p:sp>
+        <p:nvSpPr>
+          <p:cNvPr id="3" name="Content Placeholder 2">
+            <a:extLst>
+              <a:ext uri="{FF2B5EF4-FFF2-40B4-BE49-F238E27FC236}">
+                <a16:creationId xmlns:a16="http://schemas.microsoft.com/office/drawing/2014/main" id="{FDA15B58-A977-97DC-3A9B-4675F2D0E0C9}"/>
+              </a:ext>
+            </a:extLst>
+          </p:cNvPr>
+          <p:cNvSpPr>
+            <a:spLocks noGrp="1"/>
+          </p:cNvSpPr>
+          <p:nvPr>
+            <p:ph idx="1"/>
+          </p:nvPr>
+        </p:nvSpPr>
+        <p:spPr/>
+        <p:txBody>
+          <a:bodyPr/>
+          <a:lstStyle/>
+          <a:p>
+            <a:pPr marL="0" indent="0">
+              <a:buNone/>
+            </a:pPr>
+            <a:r>
+              <a:rPr lang="en-US" dirty="0">
+                <a:latin typeface="PT Mono" panose="02060509020205020204" pitchFamily="49" charset="77"/>
+              </a:rPr>
+              <a:t>char * input = ”everything is a string”;</a:t>
+            </a:r>
+          </a:p>
+          <a:p>
+            <a:pPr marL="0" indent="0">
+              <a:buNone/>
+            </a:pPr>
+            <a:r>
+              <a:rPr lang="en-US" dirty="0">
+                <a:latin typeface="PT Mono" panose="02060509020205020204" pitchFamily="49" charset="77"/>
+              </a:rPr>
+              <a:t>char * token;</a:t>
+            </a:r>
+          </a:p>
+          <a:p>
+            <a:pPr marL="0" indent="0">
+              <a:buNone/>
+            </a:pPr>
+            <a:endParaRPr lang="en-US" dirty="0">
+              <a:latin typeface="PT Mono" panose="02060509020205020204" pitchFamily="49" charset="77"/>
+            </a:endParaRPr>
+          </a:p>
+          <a:p>
+            <a:pPr marL="0" indent="0">
+              <a:buNone/>
+            </a:pPr>
+            <a:r>
+              <a:rPr lang="en-US" dirty="0">
+                <a:latin typeface="PT Mono" panose="02060509020205020204" pitchFamily="49" charset="77"/>
+              </a:rPr>
+              <a:t>token = </a:t>
+            </a:r>
+            <a:r>
+              <a:rPr lang="en-US" dirty="0" err="1">
+                <a:latin typeface="PT Mono" panose="02060509020205020204" pitchFamily="49" charset="77"/>
+              </a:rPr>
+              <a:t>strtok</a:t>
+            </a:r>
+            <a:r>
+              <a:rPr lang="en-US" dirty="0">
+                <a:latin typeface="PT Mono" panose="02060509020205020204" pitchFamily="49" charset="77"/>
+              </a:rPr>
+              <a:t>(input, “ “);</a:t>
+            </a:r>
+          </a:p>
+          <a:p>
+            <a:pPr marL="0" indent="0">
+              <a:buNone/>
+            </a:pPr>
+            <a:r>
+              <a:rPr lang="en-US" dirty="0" err="1">
+                <a:latin typeface="PT Mono" panose="02060509020205020204" pitchFamily="49" charset="77"/>
+              </a:rPr>
+              <a:t>printf</a:t>
+            </a:r>
+            <a:r>
+              <a:rPr lang="en-US" dirty="0">
+                <a:latin typeface="PT Mono" panose="02060509020205020204" pitchFamily="49" charset="77"/>
+              </a:rPr>
+              <a:t>(“%s\n”, token);</a:t>
+            </a:r>
+          </a:p>
+          <a:p>
+            <a:pPr marL="0" indent="0">
+              <a:buNone/>
+            </a:pPr>
+            <a:endParaRPr lang="en-US" dirty="0">
+              <a:latin typeface="PT Mono" panose="02060509020205020204" pitchFamily="49" charset="77"/>
+            </a:endParaRPr>
+          </a:p>
+          <a:p>
+            <a:pPr marL="0" indent="0">
+              <a:buNone/>
+            </a:pPr>
+            <a:r>
+              <a:rPr lang="en-US" dirty="0">
+                <a:latin typeface="PT Mono" panose="02060509020205020204" pitchFamily="49" charset="77"/>
+              </a:rPr>
+              <a:t>while ((token = </a:t>
+            </a:r>
+            <a:r>
+              <a:rPr lang="en-US" dirty="0" err="1">
+                <a:latin typeface="PT Mono" panose="02060509020205020204" pitchFamily="49" charset="77"/>
+              </a:rPr>
+              <a:t>strtok</a:t>
+            </a:r>
+            <a:r>
+              <a:rPr lang="en-US" dirty="0">
+                <a:latin typeface="PT Mono" panose="02060509020205020204" pitchFamily="49" charset="77"/>
+              </a:rPr>
+              <a:t>(NULL, “ “)) != NULL) {</a:t>
+            </a:r>
+          </a:p>
+          <a:p>
+            <a:pPr marL="0" indent="0">
+              <a:buNone/>
+            </a:pPr>
+            <a:r>
+              <a:rPr lang="en-US" dirty="0">
+                <a:latin typeface="PT Mono" panose="02060509020205020204" pitchFamily="49" charset="77"/>
+              </a:rPr>
+              <a:t>	</a:t>
+            </a:r>
+            <a:r>
+              <a:rPr lang="en-US" dirty="0" err="1">
+                <a:latin typeface="PT Mono" panose="02060509020205020204" pitchFamily="49" charset="77"/>
+              </a:rPr>
+              <a:t>printf</a:t>
+            </a:r>
+            <a:r>
+              <a:rPr lang="en-US" dirty="0">
+                <a:latin typeface="PT Mono" panose="02060509020205020204" pitchFamily="49" charset="77"/>
+              </a:rPr>
+              <a:t>(“%s\n”, token);</a:t>
+            </a:r>
+          </a:p>
+          <a:p>
+            <a:pPr marL="0" indent="0">
+              <a:buNone/>
+            </a:pPr>
+            <a:r>
+              <a:rPr lang="en-US" dirty="0">
+                <a:latin typeface="PT Mono" panose="02060509020205020204" pitchFamily="49" charset="77"/>
+              </a:rPr>
+              <a:t>}</a:t>
+            </a:r>
+          </a:p>
+        </p:txBody>
+      </p:sp>
+    </p:spTree>
+    <p:extLst>
+      <p:ext uri="{BB962C8B-B14F-4D97-AF65-F5344CB8AC3E}">
+        <p14:creationId xmlns:p14="http://schemas.microsoft.com/office/powerpoint/2010/main" val="3235598586"/>
+      </p:ext>
+    </p:extLst>
+  </p:cSld>
+  <p:clrMapOvr>
+    <a:masterClrMapping/>
+  </p:clrMapOvr>
+</p:sld>
+</file>
+
+<file path=ppt/slides/slide9.xml><?xml version="1.0" encoding="utf-8"?>
+<p:sld xmlns:a="http://schemas.openxmlformats.org/drawingml/2006/main" xmlns:r="http://schemas.openxmlformats.org/officeDocument/2006/relationships" xmlns:p="http://schemas.openxmlformats.org/presentationml/2006/main">
+  <p:cSld>
+    <p:spTree>
+      <p:nvGrpSpPr>
+        <p:cNvPr id="1" name=""/>
+        <p:cNvGrpSpPr/>
+        <p:nvPr/>
+      </p:nvGrpSpPr>
+      <p:grpSpPr>
+        <a:xfrm>
+          <a:off x="0" y="0"/>
+          <a:ext cx="0" cy="0"/>
+          <a:chOff x="0" y="0"/>
+          <a:chExt cx="0" cy="0"/>
+        </a:xfrm>
+      </p:grpSpPr>
+      <p:sp>
+        <p:nvSpPr>
+          <p:cNvPr id="2" name="Title 1">
+            <a:extLst>
+              <a:ext uri="{FF2B5EF4-FFF2-40B4-BE49-F238E27FC236}">
+                <a16:creationId xmlns:a16="http://schemas.microsoft.com/office/drawing/2014/main" id="{52B1C09F-D465-3179-2740-AB879286E824}"/>
+              </a:ext>
+            </a:extLst>
+          </p:cNvPr>
+          <p:cNvSpPr>
+            <a:spLocks noGrp="1"/>
+          </p:cNvSpPr>
+          <p:nvPr>
+            <p:ph type="title"/>
+          </p:nvPr>
+        </p:nvSpPr>
+        <p:spPr/>
+        <p:txBody>
+          <a:bodyPr/>
+          <a:lstStyle/>
+          <a:p>
+            <a:r>
+              <a:rPr lang="en-US" dirty="0"/>
+              <a:t>How to Call </a:t>
+            </a:r>
+            <a:r>
+              <a:rPr lang="en-US" dirty="0" err="1"/>
+              <a:t>strtok</a:t>
+            </a:r>
+            <a:br>
+              <a:rPr lang="en-US" dirty="0"/>
+            </a:br>
+            <a:r>
+              <a:rPr lang="en-US" dirty="0"/>
+              <a:t>(Commented)</a:t>
+            </a:r>
+          </a:p>
+        </p:txBody>
+      </p:sp>
+      <p:sp>
+        <p:nvSpPr>
+          <p:cNvPr id="3" name="Content Placeholder 2">
+            <a:extLst>
+              <a:ext uri="{FF2B5EF4-FFF2-40B4-BE49-F238E27FC236}">
+                <a16:creationId xmlns:a16="http://schemas.microsoft.com/office/drawing/2014/main" id="{FDA15B58-A977-97DC-3A9B-4675F2D0E0C9}"/>
+              </a:ext>
+            </a:extLst>
+          </p:cNvPr>
+          <p:cNvSpPr>
+            <a:spLocks noGrp="1"/>
+          </p:cNvSpPr>
+          <p:nvPr>
+            <p:ph idx="1"/>
+          </p:nvPr>
+        </p:nvSpPr>
+        <p:spPr>
+          <a:xfrm>
+            <a:off x="685800" y="2194560"/>
+            <a:ext cx="10820400" cy="4524292"/>
+          </a:xfrm>
+        </p:spPr>
+        <p:txBody>
+          <a:bodyPr>
+            <a:normAutofit/>
+          </a:bodyPr>
+          <a:lstStyle/>
+          <a:p>
+            <a:pPr marL="0" indent="0">
+              <a:buNone/>
+            </a:pPr>
+            <a:r>
+              <a:rPr lang="en-US" dirty="0">
+                <a:latin typeface="PT Mono" panose="02060509020205020204" pitchFamily="49" charset="77"/>
+              </a:rPr>
+              <a:t>char * input = ”everything is a string”; </a:t>
+            </a:r>
+            <a:r>
+              <a:rPr lang="en-US" b="1" dirty="0">
+                <a:solidFill>
+                  <a:schemeClr val="bg1">
+                    <a:lumMod val="50000"/>
+                    <a:lumOff val="50000"/>
+                  </a:schemeClr>
+                </a:solidFill>
+                <a:latin typeface="PT Mono" panose="02060509020205020204" pitchFamily="49" charset="77"/>
+              </a:rPr>
+              <a:t>// input</a:t>
+            </a:r>
+          </a:p>
+          <a:p>
+            <a:pPr marL="0" indent="0">
+              <a:buNone/>
+            </a:pPr>
+            <a:r>
+              <a:rPr lang="en-US" dirty="0">
+                <a:latin typeface="PT Mono" panose="02060509020205020204" pitchFamily="49" charset="77"/>
+              </a:rPr>
+              <a:t>char * token; </a:t>
+            </a:r>
+            <a:r>
+              <a:rPr lang="en-US" b="1" dirty="0">
+                <a:solidFill>
+                  <a:schemeClr val="bg1">
+                    <a:lumMod val="50000"/>
+                    <a:lumOff val="50000"/>
+                  </a:schemeClr>
+                </a:solidFill>
+                <a:latin typeface="PT Mono" panose="02060509020205020204" pitchFamily="49" charset="77"/>
+              </a:rPr>
+              <a:t>// where we will store the token</a:t>
+            </a:r>
+          </a:p>
+          <a:p>
+            <a:pPr marL="0" indent="0">
+              <a:buNone/>
+            </a:pPr>
+            <a:endParaRPr lang="en-US" dirty="0">
+              <a:latin typeface="PT Mono" panose="02060509020205020204" pitchFamily="49" charset="77"/>
+            </a:endParaRPr>
+          </a:p>
+          <a:p>
+            <a:pPr marL="0" indent="0">
+              <a:buNone/>
+            </a:pPr>
+            <a:r>
+              <a:rPr lang="en-US" dirty="0">
+                <a:latin typeface="PT Mono" panose="02060509020205020204" pitchFamily="49" charset="77"/>
+              </a:rPr>
+              <a:t>token = </a:t>
+            </a:r>
+            <a:r>
+              <a:rPr lang="en-US" dirty="0" err="1">
+                <a:latin typeface="PT Mono" panose="02060509020205020204" pitchFamily="49" charset="77"/>
+              </a:rPr>
+              <a:t>strtok</a:t>
+            </a:r>
+            <a:r>
+              <a:rPr lang="en-US" dirty="0">
+                <a:latin typeface="PT Mono" panose="02060509020205020204" pitchFamily="49" charset="77"/>
+              </a:rPr>
+              <a:t>(input, “ “); </a:t>
+            </a:r>
+            <a:r>
+              <a:rPr lang="en-US" b="1" dirty="0">
+                <a:solidFill>
+                  <a:schemeClr val="bg1">
+                    <a:lumMod val="50000"/>
+                    <a:lumOff val="50000"/>
+                  </a:schemeClr>
+                </a:solidFill>
+                <a:latin typeface="PT Mono" panose="02060509020205020204" pitchFamily="49" charset="77"/>
+              </a:rPr>
+              <a:t>// start </a:t>
+            </a:r>
+            <a:r>
+              <a:rPr lang="en-US" b="1" dirty="0" err="1">
+                <a:solidFill>
+                  <a:schemeClr val="bg1">
+                    <a:lumMod val="50000"/>
+                    <a:lumOff val="50000"/>
+                  </a:schemeClr>
+                </a:solidFill>
+                <a:latin typeface="PT Mono" panose="02060509020205020204" pitchFamily="49" charset="77"/>
+              </a:rPr>
+              <a:t>strtok</a:t>
+            </a:r>
+            <a:r>
+              <a:rPr lang="en-US" b="1" dirty="0">
+                <a:solidFill>
+                  <a:schemeClr val="bg1">
+                    <a:lumMod val="50000"/>
+                    <a:lumOff val="50000"/>
+                  </a:schemeClr>
+                </a:solidFill>
+                <a:latin typeface="PT Mono" panose="02060509020205020204" pitchFamily="49" charset="77"/>
+              </a:rPr>
+              <a:t> (static pointer in </a:t>
+            </a:r>
+            <a:r>
+              <a:rPr lang="en-US" b="1" dirty="0" err="1">
+                <a:solidFill>
+                  <a:schemeClr val="bg1">
+                    <a:lumMod val="50000"/>
+                    <a:lumOff val="50000"/>
+                  </a:schemeClr>
+                </a:solidFill>
+                <a:latin typeface="PT Mono" panose="02060509020205020204" pitchFamily="49" charset="77"/>
+              </a:rPr>
+              <a:t>strtok</a:t>
+            </a:r>
+            <a:r>
+              <a:rPr lang="en-US" b="1" dirty="0">
+                <a:solidFill>
+                  <a:schemeClr val="bg1">
+                    <a:lumMod val="50000"/>
+                    <a:lumOff val="50000"/>
+                  </a:schemeClr>
+                </a:solidFill>
+                <a:latin typeface="PT Mono" panose="02060509020205020204" pitchFamily="49" charset="77"/>
+              </a:rPr>
+              <a:t> is set to input)</a:t>
+            </a:r>
+          </a:p>
+          <a:p>
+            <a:pPr marL="0" indent="0">
+              <a:buNone/>
+            </a:pPr>
+            <a:r>
+              <a:rPr lang="en-US" dirty="0" err="1">
+                <a:latin typeface="PT Mono" panose="02060509020205020204" pitchFamily="49" charset="77"/>
+              </a:rPr>
+              <a:t>printf</a:t>
+            </a:r>
+            <a:r>
+              <a:rPr lang="en-US" dirty="0">
+                <a:latin typeface="PT Mono" panose="02060509020205020204" pitchFamily="49" charset="77"/>
+              </a:rPr>
+              <a:t>(“%s\n”, token); </a:t>
+            </a:r>
+            <a:r>
+              <a:rPr lang="en-US" b="1" dirty="0">
+                <a:solidFill>
+                  <a:schemeClr val="bg1">
+                    <a:lumMod val="50000"/>
+                    <a:lumOff val="50000"/>
+                  </a:schemeClr>
+                </a:solidFill>
+                <a:latin typeface="PT Mono" panose="02060509020205020204" pitchFamily="49" charset="77"/>
+              </a:rPr>
+              <a:t>// process token</a:t>
+            </a:r>
+          </a:p>
+          <a:p>
+            <a:pPr marL="0" indent="0">
+              <a:buNone/>
+            </a:pPr>
+            <a:endParaRPr lang="en-US" dirty="0">
+              <a:latin typeface="PT Mono" panose="02060509020205020204" pitchFamily="49" charset="77"/>
+            </a:endParaRPr>
+          </a:p>
+          <a:p>
+            <a:pPr marL="0" indent="0">
+              <a:buNone/>
+            </a:pPr>
+            <a:r>
+              <a:rPr lang="en-US" dirty="0">
+                <a:latin typeface="PT Mono" panose="02060509020205020204" pitchFamily="49" charset="77"/>
+              </a:rPr>
+              <a:t>while ((token = </a:t>
+            </a:r>
+            <a:r>
+              <a:rPr lang="en-US" dirty="0" err="1">
+                <a:latin typeface="PT Mono" panose="02060509020205020204" pitchFamily="49" charset="77"/>
+              </a:rPr>
+              <a:t>strtok</a:t>
+            </a:r>
+            <a:r>
+              <a:rPr lang="en-US" dirty="0">
+                <a:latin typeface="PT Mono" panose="02060509020205020204" pitchFamily="49" charset="77"/>
+              </a:rPr>
+              <a:t>(NULL, “ “)) != NULL) { </a:t>
+            </a:r>
+            <a:r>
+              <a:rPr lang="en-US" b="1" dirty="0">
+                <a:solidFill>
+                  <a:schemeClr val="bg1">
+                    <a:lumMod val="50000"/>
+                    <a:lumOff val="50000"/>
+                  </a:schemeClr>
+                </a:solidFill>
+                <a:latin typeface="PT Mono" panose="02060509020205020204" pitchFamily="49" charset="77"/>
+              </a:rPr>
+              <a:t>// set to the next token, and run if non-null</a:t>
+            </a:r>
+          </a:p>
+          <a:p>
+            <a:pPr marL="0" indent="0">
+              <a:buNone/>
+            </a:pPr>
+            <a:r>
+              <a:rPr lang="en-US" dirty="0">
+                <a:latin typeface="PT Mono" panose="02060509020205020204" pitchFamily="49" charset="77"/>
+              </a:rPr>
+              <a:t>	</a:t>
+            </a:r>
+            <a:r>
+              <a:rPr lang="en-US" dirty="0" err="1">
+                <a:latin typeface="PT Mono" panose="02060509020205020204" pitchFamily="49" charset="77"/>
+              </a:rPr>
+              <a:t>printf</a:t>
+            </a:r>
+            <a:r>
+              <a:rPr lang="en-US" dirty="0">
+                <a:latin typeface="PT Mono" panose="02060509020205020204" pitchFamily="49" charset="77"/>
+              </a:rPr>
+              <a:t>(“%s\n”, token); </a:t>
+            </a:r>
+            <a:r>
+              <a:rPr lang="en-US" b="1">
+                <a:solidFill>
+                  <a:schemeClr val="bg1">
+                    <a:lumMod val="50000"/>
+                    <a:lumOff val="50000"/>
+                  </a:schemeClr>
+                </a:solidFill>
+                <a:latin typeface="PT Mono" panose="02060509020205020204" pitchFamily="49" charset="77"/>
+              </a:rPr>
+              <a:t>// process </a:t>
+            </a:r>
+            <a:r>
+              <a:rPr lang="en-US" b="1" dirty="0">
+                <a:solidFill>
+                  <a:schemeClr val="bg1">
+                    <a:lumMod val="50000"/>
+                    <a:lumOff val="50000"/>
+                  </a:schemeClr>
+                </a:solidFill>
+                <a:latin typeface="PT Mono" panose="02060509020205020204" pitchFamily="49" charset="77"/>
+              </a:rPr>
+              <a:t>token</a:t>
+            </a:r>
+          </a:p>
+          <a:p>
+            <a:pPr marL="0" indent="0">
+              <a:buNone/>
+            </a:pPr>
+            <a:r>
+              <a:rPr lang="en-US" dirty="0">
+                <a:latin typeface="PT Mono" panose="02060509020205020204" pitchFamily="49" charset="77"/>
+              </a:rPr>
+              <a:t>}</a:t>
+            </a:r>
+          </a:p>
+        </p:txBody>
+      </p:sp>
+    </p:spTree>
+    <p:extLst>
+      <p:ext uri="{BB962C8B-B14F-4D97-AF65-F5344CB8AC3E}">
+        <p14:creationId xmlns:p14="http://schemas.microsoft.com/office/powerpoint/2010/main" val="1425105313"/>
       </p:ext>
     </p:extLst>
   </p:cSld>

</xml_diff>